<commit_message>
Added new slide (empty, though)
</commit_message>
<xml_diff>
--- a/Presentation/Presentation.pptx
+++ b/Presentation/Presentation.pptx
@@ -176,7 +176,7 @@
           <a:p>
             <a:fld id="{3421C990-E65C-4731-9936-EE371F58753B}" type="datetimeFigureOut">
               <a:rPr lang="en-US" smtClean="0"/>
-              <a:t>10/12/2019</a:t>
+              <a:t>10/15/2019</a:t>
             </a:fld>
             <a:endParaRPr lang="en-US"/>
           </a:p>
@@ -417,7 +417,7 @@
           <a:p>
             <a:fld id="{3421C990-E65C-4731-9936-EE371F58753B}" type="datetimeFigureOut">
               <a:rPr lang="en-US" smtClean="0"/>
-              <a:t>10/12/2019</a:t>
+              <a:t>10/15/2019</a:t>
             </a:fld>
             <a:endParaRPr lang="en-US"/>
           </a:p>
@@ -972,6 +972,47 @@
           </a:prstGeom>
         </p:spPr>
       </p:pic>
+      <p:sp>
+        <p:nvSpPr>
+          <p:cNvPr id="5" name="TextBox 4">
+            <a:extLst>
+              <a:ext uri="{FF2B5EF4-FFF2-40B4-BE49-F238E27FC236}">
+                <a16:creationId xmlns:a16="http://schemas.microsoft.com/office/drawing/2014/main" id="{DC8E07B1-09C2-4048-9B6E-A696394E5746}"/>
+              </a:ext>
+            </a:extLst>
+          </p:cNvPr>
+          <p:cNvSpPr txBox="1"/>
+          <p:nvPr/>
+        </p:nvSpPr>
+        <p:spPr>
+          <a:xfrm>
+            <a:off x="634241" y="607186"/>
+            <a:ext cx="11060453" cy="769441"/>
+          </a:xfrm>
+          <a:prstGeom prst="rect">
+            <a:avLst/>
+          </a:prstGeom>
+          <a:noFill/>
+        </p:spPr>
+        <p:txBody>
+          <a:bodyPr wrap="square" rtlCol="0">
+            <a:spAutoFit/>
+          </a:bodyPr>
+          <a:lstStyle/>
+          <a:p>
+            <a:pPr algn="ctr"/>
+            <a:r>
+              <a:rPr lang="en-GB" sz="4400" dirty="0">
+                <a:latin typeface="Calisto MT" panose="02040603050505030304" pitchFamily="18" charset="0"/>
+              </a:rPr>
+              <a:t>Searching for a dataset</a:t>
+            </a:r>
+            <a:endParaRPr lang="en-US" sz="4400" dirty="0">
+              <a:latin typeface="Calisto MT" panose="02040603050505030304" pitchFamily="18" charset="0"/>
+            </a:endParaRPr>
+          </a:p>
+        </p:txBody>
+      </p:sp>
     </p:spTree>
     <p:extLst>
       <p:ext uri="{BB962C8B-B14F-4D97-AF65-F5344CB8AC3E}">

</xml_diff>